<commit_message>
simplifying the figure a little
</commit_message>
<xml_diff>
--- a/figures_for_paper/selections_figure.pptx
+++ b/figures_for_paper/selections_figure.pptx
@@ -5210,7 +5210,7 @@
         <p:spPr>
           <a:xfrm>
             <a:off x="1484754" y="4326487"/>
-            <a:ext cx="2619820" cy="461665"/>
+            <a:ext cx="2513701" cy="461665"/>
           </a:xfrm>
           <a:prstGeom prst="rect">
             <a:avLst/>
@@ -5225,13 +5225,13 @@
           <a:p>
             <a:r>
               <a:rPr lang="en-US" sz="1200" dirty="0"/>
-              <a:t>Preference for cardinal directions</a:t>
+              <a:t>Preference for horizontal directions</a:t>
             </a:r>
           </a:p>
           <a:p>
             <a:r>
               <a:rPr lang="en-US" sz="1200" dirty="0"/>
-              <a:t>Preference for off-cardinal directions</a:t>
+              <a:t>Preference for vertical directions</a:t>
             </a:r>
           </a:p>
         </p:txBody>
@@ -5379,10 +5379,10 @@
       </p:cxnSp>
       <p:cxnSp>
         <p:nvCxnSpPr>
-          <p:cNvPr id="16" name="Straight Arrow Connector 15">
-            <a:extLst>
-              <a:ext uri="{FF2B5EF4-FFF2-40B4-BE49-F238E27FC236}">
-                <a16:creationId xmlns:a16="http://schemas.microsoft.com/office/drawing/2014/main" id="{3716F7C8-8B08-9974-B0BD-20A8027B6E3B}"/>
+          <p:cNvPr id="18" name="Straight Arrow Connector 17">
+            <a:extLst>
+              <a:ext uri="{FF2B5EF4-FFF2-40B4-BE49-F238E27FC236}">
+                <a16:creationId xmlns:a16="http://schemas.microsoft.com/office/drawing/2014/main" id="{0878870A-B0C6-07BA-8FC4-1AFAFBD9C05F}"/>
               </a:ext>
             </a:extLst>
           </p:cNvPr>
@@ -5393,55 +5393,8 @@
         </p:nvCxnSpPr>
         <p:spPr>
           <a:xfrm>
-            <a:off x="3273380" y="1718882"/>
-            <a:ext cx="0" cy="276172"/>
-          </a:xfrm>
-          <a:prstGeom prst="straightConnector1">
-            <a:avLst/>
-          </a:prstGeom>
-          <a:ln w="47625">
-            <a:solidFill>
-              <a:schemeClr val="accent3">
-                <a:lumMod val="60000"/>
-                <a:lumOff val="40000"/>
-              </a:schemeClr>
-            </a:solidFill>
-            <a:tailEnd type="triangle"/>
-          </a:ln>
-        </p:spPr>
-        <p:style>
-          <a:lnRef idx="2">
-            <a:schemeClr val="dk1"/>
-          </a:lnRef>
-          <a:fillRef idx="0">
-            <a:schemeClr val="dk1"/>
-          </a:fillRef>
-          <a:effectRef idx="1">
-            <a:schemeClr val="dk1"/>
-          </a:effectRef>
-          <a:fontRef idx="minor">
-            <a:schemeClr val="tx1"/>
-          </a:fontRef>
-        </p:style>
-      </p:cxnSp>
-      <p:cxnSp>
-        <p:nvCxnSpPr>
-          <p:cNvPr id="18" name="Straight Arrow Connector 17">
-            <a:extLst>
-              <a:ext uri="{FF2B5EF4-FFF2-40B4-BE49-F238E27FC236}">
-                <a16:creationId xmlns:a16="http://schemas.microsoft.com/office/drawing/2014/main" id="{0878870A-B0C6-07BA-8FC4-1AFAFBD9C05F}"/>
-              </a:ext>
-            </a:extLst>
-          </p:cNvPr>
-          <p:cNvCxnSpPr>
-            <a:cxnSpLocks/>
-          </p:cNvCxnSpPr>
-          <p:nvPr/>
-        </p:nvCxnSpPr>
-        <p:spPr>
-          <a:xfrm>
-            <a:off x="2022513" y="2886802"/>
-            <a:ext cx="286578" cy="281271"/>
+            <a:off x="2443706" y="2453482"/>
+            <a:ext cx="0" cy="301264"/>
           </a:xfrm>
           <a:prstGeom prst="straightConnector1">
             <a:avLst/>
@@ -5483,9 +5436,9 @@
           <p:nvPr/>
         </p:nvCxnSpPr>
         <p:spPr>
-          <a:xfrm flipH="1">
-            <a:off x="2039655" y="3388563"/>
-            <a:ext cx="269436" cy="178298"/>
+          <a:xfrm>
+            <a:off x="2422986" y="2901059"/>
+            <a:ext cx="0" cy="340904"/>
           </a:xfrm>
           <a:prstGeom prst="straightConnector1">
             <a:avLst/>
@@ -5528,8 +5481,8 @@
         </p:nvCxnSpPr>
         <p:spPr>
           <a:xfrm>
-            <a:off x="2116708" y="3760170"/>
-            <a:ext cx="192383" cy="322303"/>
+            <a:off x="2386144" y="3350540"/>
+            <a:ext cx="0" cy="353242"/>
           </a:xfrm>
           <a:prstGeom prst="straightConnector1">
             <a:avLst/>

</xml_diff>